<commit_message>
adding snippets for examples of unit testing, class def, class use, env var use, wrappers, and logging
</commit_message>
<xml_diff>
--- a/Documents/IVSG_unit_testing_and_TDD.pptx
+++ b/Documents/IVSG_unit_testing_and_TDD.pptx
@@ -7383,22 +7383,30 @@
         </p:nvSpPr>
         <p:spPr/>
         <p:txBody>
-          <a:bodyPr/>
+          <a:bodyPr>
+            <a:noAutofit/>
+          </a:bodyPr>
           <a:lstStyle/>
           <a:p>
             <a:r>
-              <a:rPr lang="en-US" dirty="0">
+              <a:rPr lang="en-US" sz="3200" dirty="0">
                 <a:cs typeface="Calibri Light"/>
               </a:rPr>
-              <a:t>Current implementation is based on binary </a:t>
-            </a:r>
-            <a:r>
-              <a:rPr lang="en-US">
+              <a:t>Current implementation is based on binary assertions.  This is typical for simplicity.  For robustness, assertions pair well with rounding so that computational </a:t>
+            </a:r>
+            <a:r>
+              <a:rPr lang="en-US" sz="3200">
                 <a:cs typeface="Calibri Light"/>
               </a:rPr>
-              <a:t>assertions.  This is typical for simplicity.</a:t>
-            </a:r>
-            <a:endParaRPr lang="en-US"/>
+              <a:t>precision error does </a:t>
+            </a:r>
+            <a:r>
+              <a:rPr lang="en-US" sz="3200" dirty="0">
+                <a:cs typeface="Calibri Light"/>
+              </a:rPr>
+              <a:t>not cause the test to be “flakey” (inconsistent)</a:t>
+            </a:r>
+            <a:endParaRPr lang="en-US" sz="3200" dirty="0"/>
           </a:p>
         </p:txBody>
       </p:sp>
@@ -9859,6 +9867,15 @@
 </file>
 
 <file path=customXml/item1.xml><?xml version="1.0" encoding="utf-8"?>
+<?mso-contentType ?>
+<FormTemplates xmlns="http://schemas.microsoft.com/sharepoint/v3/contenttype/forms">
+  <Display>DocumentLibraryForm</Display>
+  <Edit>DocumentLibraryForm</Edit>
+  <New>DocumentLibraryForm</New>
+</FormTemplates>
+</file>
+
+<file path=customXml/item2.xml><?xml version="1.0" encoding="utf-8"?>
 <ct:contentTypeSchema xmlns:ct="http://schemas.microsoft.com/office/2006/metadata/contentType" xmlns:ma="http://schemas.microsoft.com/office/2006/metadata/properties/metaAttributes" ct:_="" ma:_="" ma:contentTypeName="Document" ma:contentTypeID="0x010100F38B8CB40D70B14C8E4D51682F6553DB" ma:contentTypeVersion="14" ma:contentTypeDescription="Create a new document." ma:contentTypeScope="" ma:versionID="2c3f81097a3c7aa59b1a856ff689384b">
   <xsd:schema xmlns:xsd="http://www.w3.org/2001/XMLSchema" xmlns:xs="http://www.w3.org/2001/XMLSchema" xmlns:p="http://schemas.microsoft.com/office/2006/metadata/properties" xmlns:ns3="229b778c-4269-4bec-8cd8-a19ac5d4df77" xmlns:ns4="7e5bf9d8-c429-4c51-b29d-7601a8832a99" targetNamespace="http://schemas.microsoft.com/office/2006/metadata/properties" ma:root="true" ma:fieldsID="600eab7384c27e9b49af7ac33660594f" ns3:_="" ns4:_="">
     <xsd:import namespace="229b778c-4269-4bec-8cd8-a19ac5d4df77"/>
@@ -10087,15 +10104,6 @@
 </ct:contentTypeSchema>
 </file>
 
-<file path=customXml/item2.xml><?xml version="1.0" encoding="utf-8"?>
-<?mso-contentType ?>
-<FormTemplates xmlns="http://schemas.microsoft.com/sharepoint/v3/contenttype/forms">
-  <Display>DocumentLibraryForm</Display>
-  <Edit>DocumentLibraryForm</Edit>
-  <New>DocumentLibraryForm</New>
-</FormTemplates>
-</file>
-
 <file path=customXml/item3.xml><?xml version="1.0" encoding="utf-8"?>
 <p:properties xmlns:p="http://schemas.microsoft.com/office/2006/metadata/properties" xmlns:xsi="http://www.w3.org/2001/XMLSchema-instance" xmlns:pc="http://schemas.microsoft.com/office/infopath/2007/PartnerControls">
   <documentManagement/>
@@ -10103,6 +10111,14 @@
 </file>
 
 <file path=customXml/itemProps1.xml><?xml version="1.0" encoding="utf-8"?>
+<ds:datastoreItem xmlns:ds="http://schemas.openxmlformats.org/officeDocument/2006/customXml" ds:itemID="{7578B56D-55F6-4857-A8FF-C2C7DA901C75}">
+  <ds:schemaRefs>
+    <ds:schemaRef ds:uri="http://schemas.microsoft.com/sharepoint/v3/contenttype/forms"/>
+  </ds:schemaRefs>
+</ds:datastoreItem>
+</file>
+
+<file path=customXml/itemProps2.xml><?xml version="1.0" encoding="utf-8"?>
 <ds:datastoreItem xmlns:ds="http://schemas.openxmlformats.org/officeDocument/2006/customXml" ds:itemID="{8EDC84EC-F4B0-441C-B309-B3403A997C9A}">
   <ds:schemaRefs>
     <ds:schemaRef ds:uri="http://schemas.microsoft.com/office/2006/metadata/contentType"/>
@@ -10117,14 +10133,6 @@
     <ds:schemaRef ds:uri="http://purl.org/dc/elements/1.1/"/>
     <ds:schemaRef ds:uri="http://purl.org/dc/terms/"/>
     <ds:schemaRef ds:uri="http://schemas.microsoft.com/internal/obd"/>
-  </ds:schemaRefs>
-</ds:datastoreItem>
-</file>
-
-<file path=customXml/itemProps2.xml><?xml version="1.0" encoding="utf-8"?>
-<ds:datastoreItem xmlns:ds="http://schemas.openxmlformats.org/officeDocument/2006/customXml" ds:itemID="{7578B56D-55F6-4857-A8FF-C2C7DA901C75}">
-  <ds:schemaRefs>
-    <ds:schemaRef ds:uri="http://schemas.microsoft.com/sharepoint/v3/contenttype/forms"/>
   </ds:schemaRefs>
 </ds:datastoreItem>
 </file>

</xml_diff>

<commit_message>
adding slide about flagging utility
</commit_message>
<xml_diff>
--- a/Documents/IVSG_unit_testing_and_TDD.pptx
+++ b/Documents/IVSG_unit_testing_and_TDD.pptx
@@ -24,8 +24,9 @@
     <p:sldId id="275" r:id="rId18"/>
     <p:sldId id="276" r:id="rId19"/>
     <p:sldId id="277" r:id="rId20"/>
-    <p:sldId id="274" r:id="rId21"/>
-    <p:sldId id="278" r:id="rId22"/>
+    <p:sldId id="279" r:id="rId21"/>
+    <p:sldId id="274" r:id="rId22"/>
+    <p:sldId id="278" r:id="rId23"/>
   </p:sldIdLst>
   <p:sldSz cx="12192000" cy="6858000"/>
   <p:notesSz cx="6858000" cy="9144000"/>
@@ -263,7 +264,7 @@
           <a:p>
             <a:fld id="{846CE7D5-CF57-46EF-B807-FDD0502418D4}" type="datetimeFigureOut">
               <a:rPr lang="en-US" smtClean="0"/>
-              <a:t>10-Feb-22</a:t>
+              <a:t>17-Feb-22</a:t>
             </a:fld>
             <a:endParaRPr lang="en-US"/>
           </a:p>
@@ -433,7 +434,7 @@
           <a:p>
             <a:fld id="{846CE7D5-CF57-46EF-B807-FDD0502418D4}" type="datetimeFigureOut">
               <a:rPr lang="en-US" smtClean="0"/>
-              <a:t>10-Feb-22</a:t>
+              <a:t>17-Feb-22</a:t>
             </a:fld>
             <a:endParaRPr lang="en-US"/>
           </a:p>
@@ -613,7 +614,7 @@
           <a:p>
             <a:fld id="{846CE7D5-CF57-46EF-B807-FDD0502418D4}" type="datetimeFigureOut">
               <a:rPr lang="en-US" smtClean="0"/>
-              <a:t>10-Feb-22</a:t>
+              <a:t>17-Feb-22</a:t>
             </a:fld>
             <a:endParaRPr lang="en-US"/>
           </a:p>
@@ -783,7 +784,7 @@
           <a:p>
             <a:fld id="{846CE7D5-CF57-46EF-B807-FDD0502418D4}" type="datetimeFigureOut">
               <a:rPr lang="en-US" smtClean="0"/>
-              <a:t>10-Feb-22</a:t>
+              <a:t>17-Feb-22</a:t>
             </a:fld>
             <a:endParaRPr lang="en-US"/>
           </a:p>
@@ -1029,7 +1030,7 @@
           <a:p>
             <a:fld id="{846CE7D5-CF57-46EF-B807-FDD0502418D4}" type="datetimeFigureOut">
               <a:rPr lang="en-US" smtClean="0"/>
-              <a:t>10-Feb-22</a:t>
+              <a:t>17-Feb-22</a:t>
             </a:fld>
             <a:endParaRPr lang="en-US"/>
           </a:p>
@@ -1261,7 +1262,7 @@
           <a:p>
             <a:fld id="{846CE7D5-CF57-46EF-B807-FDD0502418D4}" type="datetimeFigureOut">
               <a:rPr lang="en-US" smtClean="0"/>
-              <a:t>10-Feb-22</a:t>
+              <a:t>17-Feb-22</a:t>
             </a:fld>
             <a:endParaRPr lang="en-US"/>
           </a:p>
@@ -1628,7 +1629,7 @@
           <a:p>
             <a:fld id="{846CE7D5-CF57-46EF-B807-FDD0502418D4}" type="datetimeFigureOut">
               <a:rPr lang="en-US" smtClean="0"/>
-              <a:t>10-Feb-22</a:t>
+              <a:t>17-Feb-22</a:t>
             </a:fld>
             <a:endParaRPr lang="en-US"/>
           </a:p>
@@ -1746,7 +1747,7 @@
           <a:p>
             <a:fld id="{846CE7D5-CF57-46EF-B807-FDD0502418D4}" type="datetimeFigureOut">
               <a:rPr lang="en-US" smtClean="0"/>
-              <a:t>10-Feb-22</a:t>
+              <a:t>17-Feb-22</a:t>
             </a:fld>
             <a:endParaRPr lang="en-US"/>
           </a:p>
@@ -1841,7 +1842,7 @@
           <a:p>
             <a:fld id="{846CE7D5-CF57-46EF-B807-FDD0502418D4}" type="datetimeFigureOut">
               <a:rPr lang="en-US" smtClean="0"/>
-              <a:t>10-Feb-22</a:t>
+              <a:t>17-Feb-22</a:t>
             </a:fld>
             <a:endParaRPr lang="en-US"/>
           </a:p>
@@ -2118,7 +2119,7 @@
           <a:p>
             <a:fld id="{846CE7D5-CF57-46EF-B807-FDD0502418D4}" type="datetimeFigureOut">
               <a:rPr lang="en-US" smtClean="0"/>
-              <a:t>10-Feb-22</a:t>
+              <a:t>17-Feb-22</a:t>
             </a:fld>
             <a:endParaRPr lang="en-US"/>
           </a:p>
@@ -2375,7 +2376,7 @@
           <a:p>
             <a:fld id="{846CE7D5-CF57-46EF-B807-FDD0502418D4}" type="datetimeFigureOut">
               <a:rPr lang="en-US" smtClean="0"/>
-              <a:t>10-Feb-22</a:t>
+              <a:t>17-Feb-22</a:t>
             </a:fld>
             <a:endParaRPr lang="en-US"/>
           </a:p>
@@ -2588,7 +2589,7 @@
           <a:p>
             <a:fld id="{846CE7D5-CF57-46EF-B807-FDD0502418D4}" type="datetimeFigureOut">
               <a:rPr lang="en-US" smtClean="0"/>
-              <a:t>10-Feb-22</a:t>
+              <a:t>17-Feb-22</a:t>
             </a:fld>
             <a:endParaRPr lang="en-US"/>
           </a:p>
@@ -3175,14 +3176,11 @@
           <a:lstStyle/>
           <a:p>
             <a:r>
-              <a:rPr lang="en-US" sz="3200" dirty="0" smtClean="0">
+              <a:rPr lang="en-US" sz="3200" dirty="0">
                 <a:cs typeface="Calibri Light"/>
               </a:rPr>
               <a:t>Failure summaries indicate failed function and test case.  Test case names are generated programmatically from the name of the section in which the assertions occur.</a:t>
             </a:r>
-            <a:endParaRPr lang="en-US" sz="3200" dirty="0">
-              <a:cs typeface="Calibri Light"/>
-            </a:endParaRPr>
           </a:p>
         </p:txBody>
       </p:sp>
@@ -3832,25 +3830,7 @@
               <a:rPr lang="en-US" sz="3200" dirty="0">
                 <a:cs typeface="Calibri Light"/>
               </a:rPr>
-              <a:t>Wrappers can be used to create test </a:t>
-            </a:r>
-            <a:r>
-              <a:rPr lang="en-US" sz="3200" dirty="0" smtClean="0">
-                <a:cs typeface="Calibri Light"/>
-              </a:rPr>
-              <a:t>cases from assertions, test suites from files of assertions, </a:t>
-            </a:r>
-            <a:r>
-              <a:rPr lang="en-US" sz="3200" dirty="0">
-                <a:cs typeface="Calibri Light"/>
-              </a:rPr>
-              <a:t>and trigger all created test suites in a given </a:t>
-            </a:r>
-            <a:r>
-              <a:rPr lang="en-US" sz="3200" dirty="0" smtClean="0">
-                <a:cs typeface="Calibri Light"/>
-              </a:rPr>
-              <a:t>repository, while logging the outputs.</a:t>
+              <a:t>Wrappers can be used to create test cases from assertions, test suites from files of assertions, and trigger all created test suites in a given repository, while logging the outputs.</a:t>
             </a:r>
             <a:endParaRPr lang="en-US" sz="3200" dirty="0"/>
           </a:p>
@@ -4178,14 +4158,14 @@
           </a:p>
           <a:p>
             <a:r>
-              <a:rPr lang="en-US" sz="1600" dirty="0" smtClean="0">
+              <a:rPr lang="en-US" sz="1600" dirty="0">
                 <a:latin typeface="Courier New"/>
                 <a:cs typeface="Courier New"/>
               </a:rPr>
               <a:t>diary </a:t>
             </a:r>
             <a:r>
-              <a:rPr lang="en-US" sz="1600" dirty="0" smtClean="0">
+              <a:rPr lang="en-US" sz="1600" dirty="0">
                 <a:solidFill>
                   <a:srgbClr val="FF0000"/>
                 </a:solidFill>
@@ -4195,14 +4175,14 @@
               <a:t>‘script_test_fcn_geometry_all_stdout.txt’</a:t>
             </a:r>
             <a:r>
-              <a:rPr lang="en-US" sz="1600" dirty="0" smtClean="0">
+              <a:rPr lang="en-US" sz="1600" dirty="0">
                 <a:latin typeface="Courier New"/>
                 <a:cs typeface="Courier New"/>
               </a:rPr>
               <a:t>; </a:t>
             </a:r>
             <a:r>
-              <a:rPr lang="en-US" sz="1600" dirty="0" smtClean="0">
+              <a:rPr lang="en-US" sz="1600" dirty="0">
                 <a:solidFill>
                   <a:schemeClr val="accent6">
                     <a:lumMod val="75000"/>
@@ -4215,7 +4195,7 @@
               <a:t>% this is </a:t>
             </a:r>
             <a:r>
-              <a:rPr lang="en-US" sz="1600" dirty="0" err="1" smtClean="0">
+              <a:rPr lang="en-US" sz="1600" dirty="0" err="1">
                 <a:solidFill>
                   <a:schemeClr val="accent6">
                     <a:lumMod val="75000"/>
@@ -4228,7 +4208,7 @@
               <a:t>git</a:t>
             </a:r>
             <a:r>
-              <a:rPr lang="en-US" sz="1600" dirty="0" smtClean="0">
+              <a:rPr lang="en-US" sz="1600" dirty="0">
                 <a:solidFill>
                   <a:schemeClr val="accent6">
                     <a:lumMod val="75000"/>
@@ -4240,14 +4220,14 @@
               </a:rPr>
               <a:t> ignored</a:t>
             </a:r>
-            <a:endParaRPr lang="en-US" sz="1600" dirty="0" smtClean="0">
+            <a:endParaRPr lang="en-US" sz="1600" dirty="0">
               <a:latin typeface="Courier New"/>
               <a:cs typeface="Courier New"/>
             </a:endParaRPr>
           </a:p>
           <a:p>
             <a:r>
-              <a:rPr lang="en-US" sz="1400" dirty="0" smtClean="0">
+              <a:rPr lang="en-US" sz="1400" dirty="0">
                 <a:solidFill>
                   <a:schemeClr val="accent1">
                     <a:lumMod val="75000"/>
@@ -4260,7 +4240,7 @@
               <a:t>for </a:t>
             </a:r>
             <a:r>
-              <a:rPr lang="en-US" sz="1400" dirty="0" err="1" smtClean="0">
+              <a:rPr lang="en-US" sz="1400" dirty="0" err="1">
                 <a:latin typeface="Courier New"/>
                 <a:ea typeface="+mn-lt"/>
                 <a:cs typeface="+mn-lt"/>
@@ -4268,7 +4248,7 @@
               <a:t>i_script</a:t>
             </a:r>
             <a:r>
-              <a:rPr lang="en-US" sz="1400" dirty="0" smtClean="0">
+              <a:rPr lang="en-US" sz="1400" dirty="0">
                 <a:latin typeface="Courier New"/>
                 <a:ea typeface="+mn-lt"/>
                 <a:cs typeface="+mn-lt"/>
@@ -4276,7 +4256,7 @@
               <a:t> = 1:length(</a:t>
             </a:r>
             <a:r>
-              <a:rPr lang="en-US" sz="1400" dirty="0" err="1" smtClean="0">
+              <a:rPr lang="en-US" sz="1400" dirty="0" err="1">
                 <a:latin typeface="Courier New"/>
                 <a:ea typeface="+mn-lt"/>
                 <a:cs typeface="+mn-lt"/>
@@ -4284,7 +4264,7 @@
               <a:t>all_scripts</a:t>
             </a:r>
             <a:r>
-              <a:rPr lang="en-US" sz="1400" dirty="0" smtClean="0">
+              <a:rPr lang="en-US" sz="1400" dirty="0">
                 <a:latin typeface="Courier New"/>
                 <a:ea typeface="+mn-lt"/>
                 <a:cs typeface="+mn-lt"/>
@@ -4663,47 +4643,18 @@
                 <a:ea typeface="+mn-lt"/>
                 <a:cs typeface="+mn-lt"/>
               </a:rPr>
-              <a:t>        suites(end+1) = suite</a:t>
-            </a:r>
-            <a:r>
-              <a:rPr lang="en-US" sz="1400" dirty="0" smtClean="0">
-                <a:latin typeface="Courier New"/>
-                <a:ea typeface="+mn-lt"/>
-                <a:cs typeface="+mn-lt"/>
-              </a:rPr>
-              <a:t>;</a:t>
-            </a:r>
-          </a:p>
-          <a:p>
-            <a:r>
-              <a:rPr lang="en-US" sz="1400" dirty="0" smtClean="0">
-                <a:latin typeface="Courier New"/>
-                <a:ea typeface="+mn-lt"/>
-                <a:cs typeface="+mn-lt"/>
-              </a:rPr>
-              <a:t>        results </a:t>
-            </a:r>
+              <a:t>        suites(end+1) = suite;</a:t>
+            </a:r>
+          </a:p>
+          <a:p>
             <a:r>
               <a:rPr lang="en-US" sz="1400" dirty="0">
                 <a:latin typeface="Courier New"/>
                 <a:ea typeface="+mn-lt"/>
                 <a:cs typeface="+mn-lt"/>
               </a:rPr>
-              <a:t>= run(suites</a:t>
-            </a:r>
-            <a:r>
-              <a:rPr lang="en-US" sz="1400" dirty="0" smtClean="0">
-                <a:latin typeface="Courier New"/>
-                <a:ea typeface="+mn-lt"/>
-                <a:cs typeface="+mn-lt"/>
-              </a:rPr>
-              <a:t>);</a:t>
-            </a:r>
-            <a:endParaRPr lang="en-US" sz="1400" dirty="0">
-              <a:latin typeface="Courier New"/>
-              <a:ea typeface="+mn-lt"/>
-              <a:cs typeface="+mn-lt"/>
-            </a:endParaRPr>
+              <a:t>        results = run(suites);</a:t>
+            </a:r>
           </a:p>
           <a:p>
             <a:r>
@@ -4730,7 +4681,7 @@
           </a:p>
           <a:p>
             <a:r>
-              <a:rPr lang="en-US" sz="1400" dirty="0" smtClean="0">
+              <a:rPr lang="en-US" sz="1400" dirty="0">
                 <a:solidFill>
                   <a:schemeClr val="accent1">
                     <a:lumMod val="75000"/>
@@ -4742,16 +4693,6 @@
               </a:rPr>
               <a:t>end</a:t>
             </a:r>
-            <a:endParaRPr lang="en-US" sz="1400" dirty="0">
-              <a:solidFill>
-                <a:schemeClr val="accent1">
-                  <a:lumMod val="75000"/>
-                </a:schemeClr>
-              </a:solidFill>
-              <a:latin typeface="Courier New"/>
-              <a:ea typeface="+mn-lt"/>
-              <a:cs typeface="+mn-lt"/>
-            </a:endParaRPr>
           </a:p>
         </p:txBody>
       </p:sp>
@@ -4921,19 +4862,7 @@
               <a:rPr lang="en-US" dirty="0">
                 <a:cs typeface="Calibri Light"/>
               </a:rPr>
-              <a:t>This </a:t>
-            </a:r>
-            <a:r>
-              <a:rPr lang="en-US" dirty="0" smtClean="0">
-                <a:cs typeface="Calibri Light"/>
-              </a:rPr>
-              <a:t>ensures </a:t>
-            </a:r>
-            <a:r>
-              <a:rPr lang="en-US" dirty="0">
-                <a:cs typeface="Calibri Light"/>
-              </a:rPr>
-              <a:t>only the functionality to meet the requirement is added.</a:t>
+              <a:t>This ensures only the functionality to meet the requirement is added.</a:t>
             </a:r>
           </a:p>
         </p:txBody>
@@ -5525,19 +5454,7 @@
               <a:rPr lang="en-US" dirty="0">
                 <a:cs typeface="Calibri Light"/>
               </a:rPr>
-              <a:t>This </a:t>
-            </a:r>
-            <a:r>
-              <a:rPr lang="en-US" dirty="0" smtClean="0">
-                <a:cs typeface="Calibri Light"/>
-              </a:rPr>
-              <a:t>ensures </a:t>
-            </a:r>
-            <a:r>
-              <a:rPr lang="en-US" dirty="0">
-                <a:cs typeface="Calibri Light"/>
-              </a:rPr>
-              <a:t>only the functionality to meet the requirement is added.</a:t>
+              <a:t>This ensures only the functionality to meet the requirement is added.</a:t>
             </a:r>
           </a:p>
         </p:txBody>
@@ -6136,19 +6053,7 @@
               <a:rPr lang="en-US" dirty="0">
                 <a:cs typeface="Calibri Light"/>
               </a:rPr>
-              <a:t>This </a:t>
-            </a:r>
-            <a:r>
-              <a:rPr lang="en-US" dirty="0" smtClean="0">
-                <a:cs typeface="Calibri Light"/>
-              </a:rPr>
-              <a:t>ensures </a:t>
-            </a:r>
-            <a:r>
-              <a:rPr lang="en-US" dirty="0">
-                <a:cs typeface="Calibri Light"/>
-              </a:rPr>
-              <a:t>only the functionality to meet the requirement is added.</a:t>
+              <a:t>This ensures only the functionality to meet the requirement is added.</a:t>
             </a:r>
           </a:p>
         </p:txBody>
@@ -6715,7 +6620,7 @@
               <a:t>args</a:t>
             </a:r>
             <a:r>
-              <a:rPr lang="en-US" sz="1600" dirty="0" smtClean="0">
+              <a:rPr lang="en-US" sz="1600" dirty="0">
                 <a:solidFill>
                   <a:srgbClr val="028009"/>
                 </a:solidFill>
@@ -6734,47 +6639,50 @@
                 <a:latin typeface="Courier New"/>
                 <a:cs typeface="Courier New"/>
               </a:rPr>
-              <a:t> </a:t>
-            </a:r>
-            <a:r>
-              <a:rPr lang="en-US" sz="1600" dirty="0" smtClean="0">
+              <a:t>   </a:t>
+            </a:r>
+            <a:r>
+              <a:rPr lang="en-US" sz="1600" dirty="0" err="1">
                 <a:solidFill>
                   <a:srgbClr val="028009"/>
                 </a:solidFill>
                 <a:latin typeface="Courier New"/>
                 <a:cs typeface="Courier New"/>
               </a:rPr>
-              <a:t>  </a:t>
-            </a:r>
-            <a:r>
-              <a:rPr lang="en-US" sz="1600" dirty="0" err="1" smtClean="0">
+              <a:t>ans</a:t>
+            </a:r>
+            <a:r>
+              <a:rPr lang="en-US" sz="1600" dirty="0">
                 <a:solidFill>
                   <a:srgbClr val="028009"/>
                 </a:solidFill>
                 <a:latin typeface="Courier New"/>
                 <a:cs typeface="Courier New"/>
               </a:rPr>
-              <a:t>ans</a:t>
-            </a:r>
-            <a:r>
-              <a:rPr lang="en-US" sz="1600" dirty="0" smtClean="0">
+              <a:t> = 0</a:t>
+            </a:r>
+          </a:p>
+          <a:p>
+            <a:r>
+              <a:rPr lang="en-US" sz="1600" dirty="0">
                 <a:solidFill>
                   <a:srgbClr val="028009"/>
                 </a:solidFill>
                 <a:latin typeface="Courier New"/>
                 <a:cs typeface="Courier New"/>
               </a:rPr>
-              <a:t> = 0</a:t>
-            </a:r>
-            <a:endParaRPr lang="en-US" sz="1600" dirty="0">
-              <a:solidFill>
-                <a:srgbClr val="028009"/>
-              </a:solidFill>
-              <a:latin typeface="Courier New"/>
-              <a:cs typeface="Courier New"/>
-            </a:endParaRPr>
-          </a:p>
-          <a:p>
+              <a:t>   for </a:t>
+            </a:r>
+            <a:r>
+              <a:rPr lang="en-US" sz="1600" dirty="0" err="1">
+                <a:solidFill>
+                  <a:srgbClr val="028009"/>
+                </a:solidFill>
+                <a:latin typeface="Courier New"/>
+                <a:cs typeface="Courier New"/>
+              </a:rPr>
+              <a:t>arg</a:t>
+            </a:r>
             <a:r>
               <a:rPr lang="en-US" sz="1600" dirty="0">
                 <a:solidFill>
@@ -6783,37 +6691,7 @@
                 <a:latin typeface="Courier New"/>
                 <a:cs typeface="Courier New"/>
               </a:rPr>
-              <a:t>   for </a:t>
-            </a:r>
-            <a:r>
-              <a:rPr lang="en-US" sz="1600" dirty="0" err="1" smtClean="0">
-                <a:solidFill>
-                  <a:srgbClr val="028009"/>
-                </a:solidFill>
-                <a:latin typeface="Courier New"/>
-                <a:cs typeface="Courier New"/>
-              </a:rPr>
-              <a:t>arg</a:t>
-            </a:r>
-            <a:r>
-              <a:rPr lang="en-US" sz="1600" dirty="0" smtClean="0">
-                <a:solidFill>
-                  <a:srgbClr val="028009"/>
-                </a:solidFill>
-                <a:latin typeface="Courier New"/>
-                <a:cs typeface="Courier New"/>
-              </a:rPr>
-              <a:t> </a:t>
-            </a:r>
-            <a:r>
-              <a:rPr lang="en-US" sz="1600" dirty="0">
-                <a:solidFill>
-                  <a:srgbClr val="028009"/>
-                </a:solidFill>
-                <a:latin typeface="Courier New"/>
-                <a:cs typeface="Courier New"/>
-              </a:rPr>
-              <a:t>in </a:t>
+              <a:t> in </a:t>
             </a:r>
             <a:r>
               <a:rPr lang="en-US" sz="1600" dirty="0" err="1">
@@ -6875,7 +6753,7 @@
               <a:t> + </a:t>
             </a:r>
             <a:r>
-              <a:rPr lang="en-US" sz="1600" dirty="0" err="1" smtClean="0">
+              <a:rPr lang="en-US" sz="1600" dirty="0" err="1">
                 <a:solidFill>
                   <a:srgbClr val="028009"/>
                 </a:solidFill>
@@ -7044,22 +6922,16 @@
               <a:rPr lang="en-US" sz="3600" dirty="0">
                 <a:cs typeface="Calibri Light"/>
               </a:rPr>
-              <a:t>Environment variables can be used to flag large types of execution on or off (e.g. input sanitation, plotting, testing</a:t>
-            </a:r>
-            <a:r>
-              <a:rPr lang="en-US" sz="3600" dirty="0" smtClean="0">
+              <a:t>Environment variables can be used to flag large types of execution on or off (e.g. input sanitation, plotting, testing).  This is done the same in </a:t>
+            </a:r>
+            <a:r>
+              <a:rPr lang="en-US" sz="3600" dirty="0" err="1">
                 <a:cs typeface="Calibri Light"/>
               </a:rPr>
-              <a:t>).  This is done the same in </a:t>
-            </a:r>
-            <a:r>
-              <a:rPr lang="en-US" sz="3600" dirty="0" err="1" smtClean="0">
-                <a:cs typeface="Calibri Light"/>
-              </a:rPr>
               <a:t>Matlab</a:t>
             </a:r>
             <a:r>
-              <a:rPr lang="en-US" sz="3600" dirty="0" smtClean="0">
+              <a:rPr lang="en-US" sz="3600" dirty="0">
                 <a:cs typeface="Calibri Light"/>
               </a:rPr>
               <a:t> regardless of OS so our code can be platform agnostic.</a:t>
@@ -8107,6 +7979,276 @@
       </p:grpSpPr>
       <p:sp>
         <p:nvSpPr>
+          <p:cNvPr id="2" name="Title 1">
+            <a:extLst>
+              <a:ext uri="{FF2B5EF4-FFF2-40B4-BE49-F238E27FC236}">
+                <a16:creationId xmlns:a16="http://schemas.microsoft.com/office/drawing/2014/main" id="{3D3A17EE-65AE-4DEB-BE84-13DE54BD4D92}"/>
+              </a:ext>
+            </a:extLst>
+          </p:cNvPr>
+          <p:cNvSpPr>
+            <a:spLocks noGrp="1"/>
+          </p:cNvSpPr>
+          <p:nvPr>
+            <p:ph type="title"/>
+          </p:nvPr>
+        </p:nvSpPr>
+        <p:spPr/>
+        <p:txBody>
+          <a:bodyPr>
+            <a:noAutofit/>
+          </a:bodyPr>
+          <a:lstStyle/>
+          <a:p>
+            <a:r>
+              <a:rPr lang="en-US" sz="3200" dirty="0"/>
+              <a:t>This is useful for setting flags, which allow users to optionally run blocks of code.  This is a more sustainable practice than commenting code on and off as it can have default behavior and associated warnings.</a:t>
+            </a:r>
+          </a:p>
+        </p:txBody>
+      </p:sp>
+      <p:pic>
+        <p:nvPicPr>
+          <p:cNvPr id="5" name="Picture 4">
+            <a:extLst>
+              <a:ext uri="{FF2B5EF4-FFF2-40B4-BE49-F238E27FC236}">
+                <a16:creationId xmlns:a16="http://schemas.microsoft.com/office/drawing/2014/main" id="{A3A3D8FE-6597-4A0B-8AFA-A628B052D516}"/>
+              </a:ext>
+            </a:extLst>
+          </p:cNvPr>
+          <p:cNvPicPr>
+            <a:picLocks noChangeAspect="1"/>
+          </p:cNvPicPr>
+          <p:nvPr/>
+        </p:nvPicPr>
+        <p:blipFill>
+          <a:blip r:embed="rId2"/>
+          <a:stretch>
+            <a:fillRect/>
+          </a:stretch>
+        </p:blipFill>
+        <p:spPr>
+          <a:xfrm>
+            <a:off x="6716971" y="2811657"/>
+            <a:ext cx="4887007" cy="2124371"/>
+          </a:xfrm>
+          <a:prstGeom prst="rect">
+            <a:avLst/>
+          </a:prstGeom>
+        </p:spPr>
+      </p:pic>
+      <p:sp>
+        <p:nvSpPr>
+          <p:cNvPr id="6" name="Right Arrow 3">
+            <a:extLst>
+              <a:ext uri="{FF2B5EF4-FFF2-40B4-BE49-F238E27FC236}">
+                <a16:creationId xmlns:a16="http://schemas.microsoft.com/office/drawing/2014/main" id="{717FE544-BAB1-43E7-8AA6-7EE6F74DE71D}"/>
+              </a:ext>
+            </a:extLst>
+          </p:cNvPr>
+          <p:cNvSpPr/>
+          <p:nvPr/>
+        </p:nvSpPr>
+        <p:spPr>
+          <a:xfrm>
+            <a:off x="4812878" y="3429000"/>
+            <a:ext cx="1324303" cy="848053"/>
+          </a:xfrm>
+          <a:prstGeom prst="rightArrow">
+            <a:avLst/>
+          </a:prstGeom>
+          <a:solidFill>
+            <a:schemeClr val="tx1"/>
+          </a:solidFill>
+          <a:ln>
+            <a:noFill/>
+          </a:ln>
+        </p:spPr>
+        <p:style>
+          <a:lnRef idx="2">
+            <a:schemeClr val="accent1">
+              <a:shade val="50000"/>
+            </a:schemeClr>
+          </a:lnRef>
+          <a:fillRef idx="1">
+            <a:schemeClr val="accent1"/>
+          </a:fillRef>
+          <a:effectRef idx="0">
+            <a:schemeClr val="accent1"/>
+          </a:effectRef>
+          <a:fontRef idx="minor">
+            <a:schemeClr val="lt1"/>
+          </a:fontRef>
+        </p:style>
+        <p:txBody>
+          <a:bodyPr rtlCol="0" anchor="ctr"/>
+          <a:lstStyle/>
+          <a:p>
+            <a:pPr algn="ctr"/>
+            <a:endParaRPr lang="en-US"/>
+          </a:p>
+        </p:txBody>
+      </p:sp>
+      <p:sp>
+        <p:nvSpPr>
+          <p:cNvPr id="7" name="Title 1">
+            <a:extLst>
+              <a:ext uri="{FF2B5EF4-FFF2-40B4-BE49-F238E27FC236}">
+                <a16:creationId xmlns:a16="http://schemas.microsoft.com/office/drawing/2014/main" id="{8A0FD25E-2986-4E19-8C54-8B422A79427D}"/>
+              </a:ext>
+            </a:extLst>
+          </p:cNvPr>
+          <p:cNvSpPr txBox="1">
+            <a:spLocks/>
+          </p:cNvSpPr>
+          <p:nvPr/>
+        </p:nvSpPr>
+        <p:spPr>
+          <a:xfrm>
+            <a:off x="838200" y="2523915"/>
+            <a:ext cx="3076074" cy="2658221"/>
+          </a:xfrm>
+          <a:prstGeom prst="rect">
+            <a:avLst/>
+          </a:prstGeom>
+        </p:spPr>
+        <p:txBody>
+          <a:bodyPr vert="horz" lIns="91440" tIns="45720" rIns="91440" bIns="45720" rtlCol="0" anchor="ctr">
+            <a:normAutofit fontScale="97500" lnSpcReduction="10000"/>
+          </a:bodyPr>
+          <a:lstStyle>
+            <a:lvl1pPr algn="l" defTabSz="914400" rtl="0" eaLnBrk="1" latinLnBrk="0" hangingPunct="1">
+              <a:lnSpc>
+                <a:spcPct val="90000"/>
+              </a:lnSpc>
+              <a:spcBef>
+                <a:spcPct val="0"/>
+              </a:spcBef>
+              <a:buNone/>
+              <a:defRPr sz="4400" kern="1200">
+                <a:solidFill>
+                  <a:schemeClr val="tx1"/>
+                </a:solidFill>
+                <a:latin typeface="+mj-lt"/>
+                <a:ea typeface="+mj-ea"/>
+                <a:cs typeface="+mj-cs"/>
+              </a:defRPr>
+            </a:lvl1pPr>
+          </a:lstStyle>
+          <a:p>
+            <a:r>
+              <a:rPr lang="en-US" sz="9600" b="1" i="1" dirty="0">
+                <a:latin typeface="Times New Roman" panose="02020603050405020304" pitchFamily="18" charset="0"/>
+                <a:cs typeface="Times New Roman" panose="02020603050405020304" pitchFamily="18" charset="0"/>
+              </a:rPr>
+              <a:t>/* //</a:t>
+            </a:r>
+          </a:p>
+          <a:p>
+            <a:r>
+              <a:rPr lang="en-US" sz="9600" b="1" i="1" dirty="0">
+                <a:latin typeface="Times New Roman" panose="02020603050405020304" pitchFamily="18" charset="0"/>
+                <a:cs typeface="Times New Roman" panose="02020603050405020304" pitchFamily="18" charset="0"/>
+              </a:rPr>
+              <a:t>% #</a:t>
+            </a:r>
+          </a:p>
+        </p:txBody>
+      </p:sp>
+      <p:sp>
+        <p:nvSpPr>
+          <p:cNvPr id="8" name="&quot;No&quot; Symbol 7">
+            <a:extLst>
+              <a:ext uri="{FF2B5EF4-FFF2-40B4-BE49-F238E27FC236}">
+                <a16:creationId xmlns:a16="http://schemas.microsoft.com/office/drawing/2014/main" id="{5B61384D-E973-4400-BA9F-37CC13B4743C}"/>
+              </a:ext>
+            </a:extLst>
+          </p:cNvPr>
+          <p:cNvSpPr/>
+          <p:nvPr/>
+        </p:nvSpPr>
+        <p:spPr>
+          <a:xfrm>
+            <a:off x="1084463" y="2811657"/>
+            <a:ext cx="1882151" cy="1882151"/>
+          </a:xfrm>
+          <a:prstGeom prst="noSmoking">
+            <a:avLst/>
+          </a:prstGeom>
+          <a:solidFill>
+            <a:srgbClr val="FF0000">
+              <a:alpha val="50196"/>
+            </a:srgbClr>
+          </a:solidFill>
+          <a:ln w="3175">
+            <a:solidFill>
+              <a:srgbClr val="000000">
+                <a:alpha val="45098"/>
+              </a:srgbClr>
+            </a:solidFill>
+          </a:ln>
+        </p:spPr>
+        <p:style>
+          <a:lnRef idx="2">
+            <a:schemeClr val="accent1">
+              <a:shade val="50000"/>
+            </a:schemeClr>
+          </a:lnRef>
+          <a:fillRef idx="1">
+            <a:schemeClr val="accent1"/>
+          </a:fillRef>
+          <a:effectRef idx="0">
+            <a:schemeClr val="accent1"/>
+          </a:effectRef>
+          <a:fontRef idx="minor">
+            <a:schemeClr val="lt1"/>
+          </a:fontRef>
+        </p:style>
+        <p:txBody>
+          <a:bodyPr rtlCol="0" anchor="ctr"/>
+          <a:lstStyle/>
+          <a:p>
+            <a:pPr algn="ctr"/>
+            <a:endParaRPr lang="en-US">
+              <a:solidFill>
+                <a:schemeClr val="tx1"/>
+              </a:solidFill>
+            </a:endParaRPr>
+          </a:p>
+        </p:txBody>
+      </p:sp>
+    </p:spTree>
+    <p:extLst>
+      <p:ext uri="{BB962C8B-B14F-4D97-AF65-F5344CB8AC3E}">
+        <p14:creationId xmlns:p14="http://schemas.microsoft.com/office/powerpoint/2010/main" val="2648003524"/>
+      </p:ext>
+    </p:extLst>
+  </p:cSld>
+  <p:clrMapOvr>
+    <a:masterClrMapping/>
+  </p:clrMapOvr>
+</p:sld>
+</file>
+
+<file path=ppt/slides/slide21.xml><?xml version="1.0" encoding="utf-8"?>
+<p:sld xmlns:a="http://schemas.openxmlformats.org/drawingml/2006/main" xmlns:r="http://schemas.openxmlformats.org/officeDocument/2006/relationships" xmlns:p="http://schemas.openxmlformats.org/presentationml/2006/main">
+  <p:cSld>
+    <p:spTree>
+      <p:nvGrpSpPr>
+        <p:cNvPr id="1" name=""/>
+        <p:cNvGrpSpPr/>
+        <p:nvPr/>
+      </p:nvGrpSpPr>
+      <p:grpSpPr>
+        <a:xfrm>
+          <a:off x="0" y="0"/>
+          <a:ext cx="0" cy="0"/>
+          <a:chOff x="0" y="0"/>
+          <a:chExt cx="0" cy="0"/>
+        </a:xfrm>
+      </p:grpSpPr>
+      <p:sp>
+        <p:nvSpPr>
           <p:cNvPr id="2" name="Title 1"/>
           <p:cNvSpPr>
             <a:spLocks noGrp="1"/>
@@ -8121,10 +8263,9 @@
           <a:lstStyle/>
           <a:p>
             <a:r>
-              <a:rPr lang="en-US" dirty="0" smtClean="0"/>
+              <a:rPr lang="en-US" dirty="0"/>
               <a:t>Performance profiling of the Geometry library.</a:t>
             </a:r>
-            <a:endParaRPr lang="en-US" dirty="0"/>
           </a:p>
         </p:txBody>
       </p:sp>
@@ -8165,7 +8306,7 @@
 </p:sld>
 </file>
 
-<file path=ppt/slides/slide21.xml><?xml version="1.0" encoding="utf-8"?>
+<file path=ppt/slides/slide22.xml><?xml version="1.0" encoding="utf-8"?>
 <p:sld xmlns:a="http://schemas.openxmlformats.org/drawingml/2006/main" xmlns:r="http://schemas.openxmlformats.org/officeDocument/2006/relationships" xmlns:p="http://schemas.openxmlformats.org/presentationml/2006/main">
   <p:cSld>
     <p:spTree>
@@ -8204,19 +8345,19 @@
           <a:lstStyle/>
           <a:p>
             <a:r>
-              <a:rPr lang="en-US" dirty="0" smtClean="0">
+              <a:rPr lang="en-US" dirty="0">
                 <a:cs typeface="Calibri Light"/>
               </a:rPr>
               <a:t>Performance profiling of the </a:t>
             </a:r>
             <a:r>
-              <a:rPr lang="en-US" dirty="0" err="1" smtClean="0">
+              <a:rPr lang="en-US" dirty="0" err="1">
                 <a:cs typeface="Calibri Light"/>
               </a:rPr>
               <a:t>MapGen</a:t>
             </a:r>
             <a:r>
-              <a:rPr lang="en-US" dirty="0" smtClean="0">
+              <a:rPr lang="en-US" dirty="0">
                 <a:cs typeface="Calibri Light"/>
               </a:rPr>
               <a:t> library.</a:t>

</xml_diff>

<commit_message>
updates to testing and git slides, fixing filename typo
</commit_message>
<xml_diff>
--- a/Documents/IVSG_unit_testing_and_TDD.pptx
+++ b/Documents/IVSG_unit_testing_and_TDD.pptx
@@ -264,7 +264,7 @@
           <a:p>
             <a:fld id="{846CE7D5-CF57-46EF-B807-FDD0502418D4}" type="datetimeFigureOut">
               <a:rPr lang="en-US" smtClean="0"/>
-              <a:t>17-Feb-22</a:t>
+              <a:t>18-Feb-22</a:t>
             </a:fld>
             <a:endParaRPr lang="en-US"/>
           </a:p>
@@ -434,7 +434,7 @@
           <a:p>
             <a:fld id="{846CE7D5-CF57-46EF-B807-FDD0502418D4}" type="datetimeFigureOut">
               <a:rPr lang="en-US" smtClean="0"/>
-              <a:t>17-Feb-22</a:t>
+              <a:t>18-Feb-22</a:t>
             </a:fld>
             <a:endParaRPr lang="en-US"/>
           </a:p>
@@ -614,7 +614,7 @@
           <a:p>
             <a:fld id="{846CE7D5-CF57-46EF-B807-FDD0502418D4}" type="datetimeFigureOut">
               <a:rPr lang="en-US" smtClean="0"/>
-              <a:t>17-Feb-22</a:t>
+              <a:t>18-Feb-22</a:t>
             </a:fld>
             <a:endParaRPr lang="en-US"/>
           </a:p>
@@ -784,7 +784,7 @@
           <a:p>
             <a:fld id="{846CE7D5-CF57-46EF-B807-FDD0502418D4}" type="datetimeFigureOut">
               <a:rPr lang="en-US" smtClean="0"/>
-              <a:t>17-Feb-22</a:t>
+              <a:t>18-Feb-22</a:t>
             </a:fld>
             <a:endParaRPr lang="en-US"/>
           </a:p>
@@ -1030,7 +1030,7 @@
           <a:p>
             <a:fld id="{846CE7D5-CF57-46EF-B807-FDD0502418D4}" type="datetimeFigureOut">
               <a:rPr lang="en-US" smtClean="0"/>
-              <a:t>17-Feb-22</a:t>
+              <a:t>18-Feb-22</a:t>
             </a:fld>
             <a:endParaRPr lang="en-US"/>
           </a:p>
@@ -1262,7 +1262,7 @@
           <a:p>
             <a:fld id="{846CE7D5-CF57-46EF-B807-FDD0502418D4}" type="datetimeFigureOut">
               <a:rPr lang="en-US" smtClean="0"/>
-              <a:t>17-Feb-22</a:t>
+              <a:t>18-Feb-22</a:t>
             </a:fld>
             <a:endParaRPr lang="en-US"/>
           </a:p>
@@ -1629,7 +1629,7 @@
           <a:p>
             <a:fld id="{846CE7D5-CF57-46EF-B807-FDD0502418D4}" type="datetimeFigureOut">
               <a:rPr lang="en-US" smtClean="0"/>
-              <a:t>17-Feb-22</a:t>
+              <a:t>18-Feb-22</a:t>
             </a:fld>
             <a:endParaRPr lang="en-US"/>
           </a:p>
@@ -1747,7 +1747,7 @@
           <a:p>
             <a:fld id="{846CE7D5-CF57-46EF-B807-FDD0502418D4}" type="datetimeFigureOut">
               <a:rPr lang="en-US" smtClean="0"/>
-              <a:t>17-Feb-22</a:t>
+              <a:t>18-Feb-22</a:t>
             </a:fld>
             <a:endParaRPr lang="en-US"/>
           </a:p>
@@ -1842,7 +1842,7 @@
           <a:p>
             <a:fld id="{846CE7D5-CF57-46EF-B807-FDD0502418D4}" type="datetimeFigureOut">
               <a:rPr lang="en-US" smtClean="0"/>
-              <a:t>17-Feb-22</a:t>
+              <a:t>18-Feb-22</a:t>
             </a:fld>
             <a:endParaRPr lang="en-US"/>
           </a:p>
@@ -2119,7 +2119,7 @@
           <a:p>
             <a:fld id="{846CE7D5-CF57-46EF-B807-FDD0502418D4}" type="datetimeFigureOut">
               <a:rPr lang="en-US" smtClean="0"/>
-              <a:t>17-Feb-22</a:t>
+              <a:t>18-Feb-22</a:t>
             </a:fld>
             <a:endParaRPr lang="en-US"/>
           </a:p>
@@ -2376,7 +2376,7 @@
           <a:p>
             <a:fld id="{846CE7D5-CF57-46EF-B807-FDD0502418D4}" type="datetimeFigureOut">
               <a:rPr lang="en-US" smtClean="0"/>
-              <a:t>17-Feb-22</a:t>
+              <a:t>18-Feb-22</a:t>
             </a:fld>
             <a:endParaRPr lang="en-US"/>
           </a:p>
@@ -2589,7 +2589,7 @@
           <a:p>
             <a:fld id="{846CE7D5-CF57-46EF-B807-FDD0502418D4}" type="datetimeFigureOut">
               <a:rPr lang="en-US" smtClean="0"/>
-              <a:t>17-Feb-22</a:t>
+              <a:t>18-Feb-22</a:t>
             </a:fld>
             <a:endParaRPr lang="en-US"/>
           </a:p>
@@ -8986,22 +8986,18 @@
         </p:nvSpPr>
         <p:spPr/>
         <p:txBody>
-          <a:bodyPr/>
+          <a:bodyPr>
+            <a:noAutofit/>
+          </a:bodyPr>
           <a:lstStyle/>
           <a:p>
             <a:r>
-              <a:rPr lang="en-US" dirty="0">
+              <a:rPr lang="en-US" sz="2800" dirty="0">
                 <a:cs typeface="Calibri Light"/>
               </a:rPr>
-              <a:t>Current implementation is based on binary </a:t>
-            </a:r>
-            <a:r>
-              <a:rPr lang="en-US">
-                <a:cs typeface="Calibri Light"/>
-              </a:rPr>
-              <a:t>assertions.  This is typical for simplicity.</a:t>
-            </a:r>
-            <a:endParaRPr lang="en-US"/>
+              <a:t>Current implementation is based on binary assertions.  This is typical for simplicity.  Assertions run as tests will not break operation.  Assertions that fail outside of tests will break operation and are a great way to throw an exception (with an informative failure message) when a critical failure is detected.</a:t>
+            </a:r>
+            <a:endParaRPr lang="en-US" sz="2800" dirty="0"/>
           </a:p>
         </p:txBody>
       </p:sp>

</xml_diff>

<commit_message>
added PPT to document entire library, created function for adding directories via single script call, minor other fixes.
</commit_message>
<xml_diff>
--- a/Documents/IVSG_unit_testing_and_TDD.pptx
+++ b/Documents/IVSG_unit_testing_and_TDD.pptx
@@ -264,7 +264,7 @@
           <a:p>
             <a:fld id="{846CE7D5-CF57-46EF-B807-FDD0502418D4}" type="datetimeFigureOut">
               <a:rPr lang="en-US" smtClean="0"/>
-              <a:t>18-Feb-22</a:t>
+              <a:t>3/27/2022</a:t>
             </a:fld>
             <a:endParaRPr lang="en-US"/>
           </a:p>
@@ -434,7 +434,7 @@
           <a:p>
             <a:fld id="{846CE7D5-CF57-46EF-B807-FDD0502418D4}" type="datetimeFigureOut">
               <a:rPr lang="en-US" smtClean="0"/>
-              <a:t>18-Feb-22</a:t>
+              <a:t>3/27/2022</a:t>
             </a:fld>
             <a:endParaRPr lang="en-US"/>
           </a:p>
@@ -614,7 +614,7 @@
           <a:p>
             <a:fld id="{846CE7D5-CF57-46EF-B807-FDD0502418D4}" type="datetimeFigureOut">
               <a:rPr lang="en-US" smtClean="0"/>
-              <a:t>18-Feb-22</a:t>
+              <a:t>3/27/2022</a:t>
             </a:fld>
             <a:endParaRPr lang="en-US"/>
           </a:p>
@@ -784,7 +784,7 @@
           <a:p>
             <a:fld id="{846CE7D5-CF57-46EF-B807-FDD0502418D4}" type="datetimeFigureOut">
               <a:rPr lang="en-US" smtClean="0"/>
-              <a:t>18-Feb-22</a:t>
+              <a:t>3/27/2022</a:t>
             </a:fld>
             <a:endParaRPr lang="en-US"/>
           </a:p>
@@ -1030,7 +1030,7 @@
           <a:p>
             <a:fld id="{846CE7D5-CF57-46EF-B807-FDD0502418D4}" type="datetimeFigureOut">
               <a:rPr lang="en-US" smtClean="0"/>
-              <a:t>18-Feb-22</a:t>
+              <a:t>3/27/2022</a:t>
             </a:fld>
             <a:endParaRPr lang="en-US"/>
           </a:p>
@@ -1262,7 +1262,7 @@
           <a:p>
             <a:fld id="{846CE7D5-CF57-46EF-B807-FDD0502418D4}" type="datetimeFigureOut">
               <a:rPr lang="en-US" smtClean="0"/>
-              <a:t>18-Feb-22</a:t>
+              <a:t>3/27/2022</a:t>
             </a:fld>
             <a:endParaRPr lang="en-US"/>
           </a:p>
@@ -1629,7 +1629,7 @@
           <a:p>
             <a:fld id="{846CE7D5-CF57-46EF-B807-FDD0502418D4}" type="datetimeFigureOut">
               <a:rPr lang="en-US" smtClean="0"/>
-              <a:t>18-Feb-22</a:t>
+              <a:t>3/27/2022</a:t>
             </a:fld>
             <a:endParaRPr lang="en-US"/>
           </a:p>
@@ -1747,7 +1747,7 @@
           <a:p>
             <a:fld id="{846CE7D5-CF57-46EF-B807-FDD0502418D4}" type="datetimeFigureOut">
               <a:rPr lang="en-US" smtClean="0"/>
-              <a:t>18-Feb-22</a:t>
+              <a:t>3/27/2022</a:t>
             </a:fld>
             <a:endParaRPr lang="en-US"/>
           </a:p>
@@ -1842,7 +1842,7 @@
           <a:p>
             <a:fld id="{846CE7D5-CF57-46EF-B807-FDD0502418D4}" type="datetimeFigureOut">
               <a:rPr lang="en-US" smtClean="0"/>
-              <a:t>18-Feb-22</a:t>
+              <a:t>3/27/2022</a:t>
             </a:fld>
             <a:endParaRPr lang="en-US"/>
           </a:p>
@@ -2119,7 +2119,7 @@
           <a:p>
             <a:fld id="{846CE7D5-CF57-46EF-B807-FDD0502418D4}" type="datetimeFigureOut">
               <a:rPr lang="en-US" smtClean="0"/>
-              <a:t>18-Feb-22</a:t>
+              <a:t>3/27/2022</a:t>
             </a:fld>
             <a:endParaRPr lang="en-US"/>
           </a:p>
@@ -2376,7 +2376,7 @@
           <a:p>
             <a:fld id="{846CE7D5-CF57-46EF-B807-FDD0502418D4}" type="datetimeFigureOut">
               <a:rPr lang="en-US" smtClean="0"/>
-              <a:t>18-Feb-22</a:t>
+              <a:t>3/27/2022</a:t>
             </a:fld>
             <a:endParaRPr lang="en-US"/>
           </a:p>
@@ -2589,7 +2589,7 @@
           <a:p>
             <a:fld id="{846CE7D5-CF57-46EF-B807-FDD0502418D4}" type="datetimeFigureOut">
               <a:rPr lang="en-US" smtClean="0"/>
-              <a:t>18-Feb-22</a:t>
+              <a:t>3/27/2022</a:t>
             </a:fld>
             <a:endParaRPr lang="en-US"/>
           </a:p>
@@ -7893,7 +7893,12 @@
             <p:ph type="title"/>
           </p:nvPr>
         </p:nvSpPr>
-        <p:spPr/>
+        <p:spPr>
+          <a:xfrm>
+            <a:off x="838200" y="681037"/>
+            <a:ext cx="10515600" cy="1325563"/>
+          </a:xfrm>
+        </p:spPr>
         <p:txBody>
           <a:bodyPr vert="horz" lIns="91440" tIns="45720" rIns="91440" bIns="45720" rtlCol="0" anchor="ctr">
             <a:noAutofit/>
@@ -7904,17 +7909,8 @@
               <a:rPr lang="en-US" sz="3600" dirty="0">
                 <a:cs typeface="Calibri Light"/>
               </a:rPr>
-              <a:t>Unit test: the most atomic type of test.  Test scope </a:t>
-            </a:r>
-            <a:r>
-              <a:rPr lang="en-US" sz="3600">
-                <a:cs typeface="Calibri Light"/>
-              </a:rPr>
-              <a:t>is something that can be logically isolated (generally no dependencies on other libraries, files, or functions).</a:t>
-            </a:r>
-            <a:endParaRPr lang="en-US" sz="3600" dirty="0">
-              <a:cs typeface="Calibri Light"/>
-            </a:endParaRPr>
+              <a:t>Unit test: the most atomic type of test.  It usually tests one small function or few lines of code. The test scope is something that can be logically isolated (generally no dependencies on other libraries, files, or functions).</a:t>
+            </a:r>
           </a:p>
         </p:txBody>
       </p:sp>
@@ -7942,8 +7938,8 @@
         </p:blipFill>
         <p:spPr>
           <a:xfrm>
-            <a:off x="4173857" y="1825625"/>
-            <a:ext cx="3844286" cy="4351338"/>
+            <a:off x="4173857" y="3253339"/>
+            <a:ext cx="2582940" cy="2923624"/>
           </a:xfrm>
         </p:spPr>
       </p:pic>
@@ -8443,22 +8439,18 @@
         </p:nvSpPr>
         <p:spPr/>
         <p:txBody>
-          <a:bodyPr/>
+          <a:bodyPr>
+            <a:normAutofit fontScale="90000"/>
+          </a:bodyPr>
           <a:lstStyle/>
           <a:p>
             <a:r>
               <a:rPr lang="en-US" dirty="0">
                 <a:cs typeface="Calibri Light"/>
               </a:rPr>
-              <a:t>Advantages: small scope allows for quick </a:t>
-            </a:r>
-            <a:r>
-              <a:rPr lang="en-US">
-                <a:cs typeface="Calibri Light"/>
-              </a:rPr>
-              <a:t>testing and straight forward debugging.</a:t>
-            </a:r>
-            <a:endParaRPr lang="en-US"/>
+              <a:t>Advantages: small scope allows for quick testing and straightforward debugging. And the overhead to the script is usually minor.</a:t>
+            </a:r>
+            <a:endParaRPr lang="en-US" dirty="0"/>
           </a:p>
         </p:txBody>
       </p:sp>
@@ -8818,22 +8810,52 @@
         </p:nvSpPr>
         <p:spPr/>
         <p:txBody>
+          <a:bodyPr>
+            <a:normAutofit/>
+          </a:bodyPr>
+          <a:lstStyle/>
+          <a:p>
+            <a:r>
+              <a:rPr lang="en-US" dirty="0">
+                <a:cs typeface="Calibri Light"/>
+              </a:rPr>
+              <a:t>Disadvantages: unit tests do not protect from integration or performance regressions. </a:t>
+            </a:r>
+            <a:endParaRPr lang="en-US" dirty="0"/>
+          </a:p>
+        </p:txBody>
+      </p:sp>
+      <p:sp>
+        <p:nvSpPr>
+          <p:cNvPr id="6" name="Content Placeholder 5">
+            <a:extLst>
+              <a:ext uri="{FF2B5EF4-FFF2-40B4-BE49-F238E27FC236}">
+                <a16:creationId xmlns:a16="http://schemas.microsoft.com/office/drawing/2014/main" id="{62647A2B-CEE6-49C3-9AE1-DDD4777E256D}"/>
+              </a:ext>
+            </a:extLst>
+          </p:cNvPr>
+          <p:cNvSpPr>
+            <a:spLocks noGrp="1"/>
+          </p:cNvSpPr>
+          <p:nvPr>
+            <p:ph idx="1"/>
+          </p:nvPr>
+        </p:nvSpPr>
+        <p:spPr/>
+        <p:txBody>
           <a:bodyPr/>
           <a:lstStyle/>
           <a:p>
+            <a:pPr marL="0" indent="0">
+              <a:buNone/>
+            </a:pPr>
             <a:r>
               <a:rPr lang="en-US" dirty="0">
                 <a:cs typeface="Calibri Light"/>
               </a:rPr>
-              <a:t>Disadvantages: unit tests do not protect from integration or </a:t>
-            </a:r>
-            <a:r>
-              <a:rPr lang="en-US">
-                <a:cs typeface="Calibri Light"/>
-              </a:rPr>
-              <a:t>performance regressions.</a:t>
-            </a:r>
-            <a:endParaRPr lang="en-US"/>
+              <a:t>For example, if the arguments to a function change, the integration may be in error even if the function itself still works. Or if a modified function takes 10,000 times longer to run than previously, the performance will regress sometimes to the point of causing other things to fail.</a:t>
+            </a:r>
+            <a:endParaRPr lang="en-US" dirty="0"/>
           </a:p>
         </p:txBody>
       </p:sp>
@@ -8859,7 +8881,7 @@
         </p:blipFill>
         <p:spPr>
           <a:xfrm>
-            <a:off x="1033378" y="2986193"/>
+            <a:off x="964865" y="4343355"/>
             <a:ext cx="4504246" cy="1538017"/>
           </a:xfrm>
           <a:prstGeom prst="rect">
@@ -8889,7 +8911,7 @@
         </p:blipFill>
         <p:spPr>
           <a:xfrm>
-            <a:off x="7894698" y="2933072"/>
+            <a:off x="8401134" y="4242533"/>
             <a:ext cx="1003359" cy="1638839"/>
           </a:xfrm>
           <a:prstGeom prst="rect">
@@ -8911,7 +8933,7 @@
         </p:nvCxnSpPr>
         <p:spPr>
           <a:xfrm>
-            <a:off x="7779055" y="2752611"/>
+            <a:off x="8291257" y="4056904"/>
             <a:ext cx="1223114" cy="1948390"/>
           </a:xfrm>
           <a:prstGeom prst="straightConnector1">
@@ -9311,13 +9333,7 @@
               <a:rPr lang="en-US" dirty="0">
                 <a:cs typeface="Calibri Light"/>
               </a:rPr>
-              <a:t>To assert that an error is not thrown, a true assertion can be placed after the point where </a:t>
-            </a:r>
-            <a:r>
-              <a:rPr lang="en-US">
-                <a:cs typeface="Calibri Light"/>
-              </a:rPr>
-              <a:t>execution would stop if an error was thrown.</a:t>
+              <a:t>To assert that an error was not thrown, a true assertion can be placed after the point where execution would stop if an error was thrown.</a:t>
             </a:r>
           </a:p>
         </p:txBody>
@@ -9617,13 +9633,7 @@
               <a:rPr lang="en-US" dirty="0">
                 <a:cs typeface="Calibri Light"/>
               </a:rPr>
-              <a:t>To assert that an error is thrown, the error </a:t>
-            </a:r>
-            <a:r>
-              <a:rPr lang="en-US">
-                <a:cs typeface="Calibri Light"/>
-              </a:rPr>
-              <a:t>can be caught and verified to avoid breaking execution.</a:t>
+              <a:t>To assert that an error is thrown, the error can be caught and verified to avoid breaking execution. The try-catch functionality works well for this.</a:t>
             </a:r>
           </a:p>
         </p:txBody>

</xml_diff>